<commit_message>
Added Final ERD to Alexander and Powerpoint for Milestone 4
</commit_message>
<xml_diff>
--- a/Idea's and Collaborated Milestones/Alexander/Green Group Milestone 4.pptx
+++ b/Idea's and Collaborated Milestones/Alexander/Green Group Milestone 4.pptx
@@ -117,6 +117,11 @@
       </a:defRPr>
     </a:lvl9pPr>
   </p:defaultTextStyle>
+  <p:extLst>
+    <p:ext uri="{EFAFB233-063F-42B5-8137-9DF3F51BA10A}">
+      <p15:sldGuideLst xmlns:p15="http://schemas.microsoft.com/office/powerpoint/2012/main"/>
+    </p:ext>
+  </p:extLst>
 </p:presentation>
 </file>
 
@@ -12745,6 +12750,9 @@
           </a:bodyPr>
           <a:lstStyle/>
           <a:p>
+            <a:pPr marL="0" indent="0">
+              <a:buNone/>
+            </a:pPr>
             <a:r>
               <a:rPr lang="en-US" sz="1900">
                 <a:latin typeface="Times New Roman" panose="02020603050405020304" pitchFamily="18" charset="0"/>
@@ -12755,7 +12763,7 @@
           </a:p>
           <a:p>
             <a:r>
-              <a:rPr lang="en-US" sz="1900">
+              <a:rPr lang="en-US" sz="1900" dirty="0">
                 <a:latin typeface="Times New Roman" panose="02020603050405020304" pitchFamily="18" charset="0"/>
                 <a:cs typeface="Times New Roman" panose="02020603050405020304" pitchFamily="18" charset="0"/>
               </a:rPr>
@@ -12764,7 +12772,7 @@
           </a:p>
           <a:p>
             <a:r>
-              <a:rPr lang="en-US" sz="1900">
+              <a:rPr lang="en-US" sz="1900" dirty="0">
                 <a:latin typeface="Times New Roman" panose="02020603050405020304" pitchFamily="18" charset="0"/>
                 <a:cs typeface="Times New Roman" panose="02020603050405020304" pitchFamily="18" charset="0"/>
               </a:rPr>
@@ -12773,7 +12781,7 @@
           </a:p>
           <a:p>
             <a:r>
-              <a:rPr lang="en-US" sz="1900">
+              <a:rPr lang="en-US" sz="1900" dirty="0">
                 <a:latin typeface="Times New Roman" panose="02020603050405020304" pitchFamily="18" charset="0"/>
                 <a:cs typeface="Times New Roman" panose="02020603050405020304" pitchFamily="18" charset="0"/>
               </a:rPr>
@@ -12782,7 +12790,7 @@
           </a:p>
           <a:p>
             <a:r>
-              <a:rPr lang="en-US" sz="1900">
+              <a:rPr lang="en-US" sz="1900" dirty="0">
                 <a:latin typeface="Times New Roman" panose="02020603050405020304" pitchFamily="18" charset="0"/>
                 <a:cs typeface="Times New Roman" panose="02020603050405020304" pitchFamily="18" charset="0"/>
               </a:rPr>
@@ -12791,7 +12799,7 @@
           </a:p>
           <a:p>
             <a:r>
-              <a:rPr lang="en-US" sz="1900">
+              <a:rPr lang="en-US" sz="1900" dirty="0">
                 <a:latin typeface="Times New Roman" panose="02020603050405020304" pitchFamily="18" charset="0"/>
                 <a:cs typeface="Times New Roman" panose="02020603050405020304" pitchFamily="18" charset="0"/>
               </a:rPr>

</xml_diff>